<commit_message>
- Update FAQs for upcoming release. - Rename graphviz setting in rlgraph config to `GRAPHVIZ_RENDER_BUILD_ERRORS`.
</commit_message>
<xml_diff>
--- a/docs/images/image_ppt.pptx
+++ b/docs/images/image_ppt.pptx
@@ -10,6 +10,7 @@
     <p:sldId id="258" r:id="rId4"/>
     <p:sldId id="259" r:id="rId5"/>
     <p:sldId id="260" r:id="rId6"/>
+    <p:sldId id="261" r:id="rId7"/>
   </p:sldIdLst>
   <p:sldSz cx="12192000" cy="6858000"/>
   <p:notesSz cx="6858000" cy="9144000"/>
@@ -263,7 +264,7 @@
           <a:p>
             <a:fld id="{80339CCA-B3FF-48E6-8D3D-C80D833CA193}" type="datetimeFigureOut">
               <a:rPr lang="en-US" smtClean="0"/>
-              <a:t>2018-10-31</a:t>
+              <a:t>2019-06-08</a:t>
             </a:fld>
             <a:endParaRPr lang="en-US"/>
           </a:p>
@@ -461,7 +462,7 @@
           <a:p>
             <a:fld id="{80339CCA-B3FF-48E6-8D3D-C80D833CA193}" type="datetimeFigureOut">
               <a:rPr lang="en-US" smtClean="0"/>
-              <a:t>2018-10-31</a:t>
+              <a:t>2019-06-08</a:t>
             </a:fld>
             <a:endParaRPr lang="en-US"/>
           </a:p>
@@ -669,7 +670,7 @@
           <a:p>
             <a:fld id="{80339CCA-B3FF-48E6-8D3D-C80D833CA193}" type="datetimeFigureOut">
               <a:rPr lang="en-US" smtClean="0"/>
-              <a:t>2018-10-31</a:t>
+              <a:t>2019-06-08</a:t>
             </a:fld>
             <a:endParaRPr lang="en-US"/>
           </a:p>
@@ -867,7 +868,7 @@
           <a:p>
             <a:fld id="{80339CCA-B3FF-48E6-8D3D-C80D833CA193}" type="datetimeFigureOut">
               <a:rPr lang="en-US" smtClean="0"/>
-              <a:t>2018-10-31</a:t>
+              <a:t>2019-06-08</a:t>
             </a:fld>
             <a:endParaRPr lang="en-US"/>
           </a:p>
@@ -1142,7 +1143,7 @@
           <a:p>
             <a:fld id="{80339CCA-B3FF-48E6-8D3D-C80D833CA193}" type="datetimeFigureOut">
               <a:rPr lang="en-US" smtClean="0"/>
-              <a:t>2018-10-31</a:t>
+              <a:t>2019-06-08</a:t>
             </a:fld>
             <a:endParaRPr lang="en-US"/>
           </a:p>
@@ -1407,7 +1408,7 @@
           <a:p>
             <a:fld id="{80339CCA-B3FF-48E6-8D3D-C80D833CA193}" type="datetimeFigureOut">
               <a:rPr lang="en-US" smtClean="0"/>
-              <a:t>2018-10-31</a:t>
+              <a:t>2019-06-08</a:t>
             </a:fld>
             <a:endParaRPr lang="en-US"/>
           </a:p>
@@ -1819,7 +1820,7 @@
           <a:p>
             <a:fld id="{80339CCA-B3FF-48E6-8D3D-C80D833CA193}" type="datetimeFigureOut">
               <a:rPr lang="en-US" smtClean="0"/>
-              <a:t>2018-10-31</a:t>
+              <a:t>2019-06-08</a:t>
             </a:fld>
             <a:endParaRPr lang="en-US"/>
           </a:p>
@@ -1960,7 +1961,7 @@
           <a:p>
             <a:fld id="{80339CCA-B3FF-48E6-8D3D-C80D833CA193}" type="datetimeFigureOut">
               <a:rPr lang="en-US" smtClean="0"/>
-              <a:t>2018-10-31</a:t>
+              <a:t>2019-06-08</a:t>
             </a:fld>
             <a:endParaRPr lang="en-US"/>
           </a:p>
@@ -2073,7 +2074,7 @@
           <a:p>
             <a:fld id="{80339CCA-B3FF-48E6-8D3D-C80D833CA193}" type="datetimeFigureOut">
               <a:rPr lang="en-US" smtClean="0"/>
-              <a:t>2018-10-31</a:t>
+              <a:t>2019-06-08</a:t>
             </a:fld>
             <a:endParaRPr lang="en-US"/>
           </a:p>
@@ -2384,7 +2385,7 @@
           <a:p>
             <a:fld id="{80339CCA-B3FF-48E6-8D3D-C80D833CA193}" type="datetimeFigureOut">
               <a:rPr lang="en-US" smtClean="0"/>
-              <a:t>2018-10-31</a:t>
+              <a:t>2019-06-08</a:t>
             </a:fld>
             <a:endParaRPr lang="en-US"/>
           </a:p>
@@ -2672,7 +2673,7 @@
           <a:p>
             <a:fld id="{80339CCA-B3FF-48E6-8D3D-C80D833CA193}" type="datetimeFigureOut">
               <a:rPr lang="en-US" smtClean="0"/>
-              <a:t>2018-10-31</a:t>
+              <a:t>2019-06-08</a:t>
             </a:fld>
             <a:endParaRPr lang="en-US"/>
           </a:p>
@@ -2913,7 +2914,7 @@
           <a:p>
             <a:fld id="{80339CCA-B3FF-48E6-8D3D-C80D833CA193}" type="datetimeFigureOut">
               <a:rPr lang="en-US" smtClean="0"/>
-              <a:t>2018-10-31</a:t>
+              <a:t>2019-06-08</a:t>
             </a:fld>
             <a:endParaRPr lang="en-US"/>
           </a:p>
@@ -13347,6 +13348,764 @@
 </p:sld>
 </file>
 
+<file path=ppt/slides/slide6.xml><?xml version="1.0" encoding="utf-8"?>
+<p:sld xmlns:a="http://schemas.openxmlformats.org/drawingml/2006/main" xmlns:r="http://schemas.openxmlformats.org/officeDocument/2006/relationships" xmlns:p="http://schemas.openxmlformats.org/presentationml/2006/main">
+  <p:cSld>
+    <p:spTree>
+      <p:nvGrpSpPr>
+        <p:cNvPr id="1" name=""/>
+        <p:cNvGrpSpPr/>
+        <p:nvPr/>
+      </p:nvGrpSpPr>
+      <p:grpSpPr>
+        <a:xfrm>
+          <a:off x="0" y="0"/>
+          <a:ext cx="0" cy="0"/>
+          <a:chOff x="0" y="0"/>
+          <a:chExt cx="0" cy="0"/>
+        </a:xfrm>
+      </p:grpSpPr>
+      <p:grpSp>
+        <p:nvGrpSpPr>
+          <p:cNvPr id="21" name="Group 20">
+            <a:extLst>
+              <a:ext uri="{FF2B5EF4-FFF2-40B4-BE49-F238E27FC236}">
+                <a16:creationId xmlns:a16="http://schemas.microsoft.com/office/drawing/2014/main" id="{396DF811-E42E-40F2-BC9C-48A4744137CA}"/>
+              </a:ext>
+            </a:extLst>
+          </p:cNvPr>
+          <p:cNvGrpSpPr/>
+          <p:nvPr/>
+        </p:nvGrpSpPr>
+        <p:grpSpPr>
+          <a:xfrm>
+            <a:off x="897622" y="813732"/>
+            <a:ext cx="2924319" cy="2668214"/>
+            <a:chOff x="897622" y="813732"/>
+            <a:chExt cx="2924319" cy="2668214"/>
+          </a:xfrm>
+        </p:grpSpPr>
+        <p:sp>
+          <p:nvSpPr>
+            <p:cNvPr id="4" name="Rectangle 3">
+              <a:extLst>
+                <a:ext uri="{FF2B5EF4-FFF2-40B4-BE49-F238E27FC236}">
+                  <a16:creationId xmlns:a16="http://schemas.microsoft.com/office/drawing/2014/main" id="{77CBBE72-5588-412A-8ACB-6053FFE9912F}"/>
+                </a:ext>
+              </a:extLst>
+            </p:cNvPr>
+            <p:cNvSpPr/>
+            <p:nvPr/>
+          </p:nvSpPr>
+          <p:spPr>
+            <a:xfrm>
+              <a:off x="897622" y="813732"/>
+              <a:ext cx="2888876" cy="2615268"/>
+            </a:xfrm>
+            <a:prstGeom prst="rect">
+              <a:avLst/>
+            </a:prstGeom>
+            <a:noFill/>
+          </p:spPr>
+          <p:style>
+            <a:lnRef idx="2">
+              <a:schemeClr val="accent1">
+                <a:shade val="50000"/>
+              </a:schemeClr>
+            </a:lnRef>
+            <a:fillRef idx="1">
+              <a:schemeClr val="accent1"/>
+            </a:fillRef>
+            <a:effectRef idx="0">
+              <a:schemeClr val="accent1"/>
+            </a:effectRef>
+            <a:fontRef idx="minor">
+              <a:schemeClr val="lt1"/>
+            </a:fontRef>
+          </p:style>
+          <p:txBody>
+            <a:bodyPr rtlCol="0" anchor="t"/>
+            <a:lstStyle/>
+            <a:p>
+              <a:r>
+                <a:rPr lang="en-US" dirty="0">
+                  <a:solidFill>
+                    <a:schemeClr val="tx1"/>
+                  </a:solidFill>
+                </a:rPr>
+                <a:t>Legend:</a:t>
+              </a:r>
+            </a:p>
+            <a:p>
+              <a:endParaRPr lang="en-US" dirty="0">
+                <a:solidFill>
+                  <a:schemeClr val="tx1"/>
+                </a:solidFill>
+              </a:endParaRPr>
+            </a:p>
+          </p:txBody>
+        </p:sp>
+        <p:sp>
+          <p:nvSpPr>
+            <p:cNvPr id="5" name="Rectangle: Rounded Corners 4">
+              <a:extLst>
+                <a:ext uri="{FF2B5EF4-FFF2-40B4-BE49-F238E27FC236}">
+                  <a16:creationId xmlns:a16="http://schemas.microsoft.com/office/drawing/2014/main" id="{317DD612-0B88-4AD7-8D7A-75A609715F43}"/>
+                </a:ext>
+              </a:extLst>
+            </p:cNvPr>
+            <p:cNvSpPr/>
+            <p:nvPr/>
+          </p:nvSpPr>
+          <p:spPr>
+            <a:xfrm>
+              <a:off x="2016247" y="1282724"/>
+              <a:ext cx="796956" cy="360726"/>
+            </a:xfrm>
+            <a:prstGeom prst="roundRect">
+              <a:avLst/>
+            </a:prstGeom>
+            <a:solidFill>
+              <a:srgbClr val="FFC000"/>
+            </a:solidFill>
+            <a:ln>
+              <a:noFill/>
+            </a:ln>
+          </p:spPr>
+          <p:style>
+            <a:lnRef idx="2">
+              <a:schemeClr val="accent1">
+                <a:shade val="50000"/>
+              </a:schemeClr>
+            </a:lnRef>
+            <a:fillRef idx="1">
+              <a:schemeClr val="accent1"/>
+            </a:fillRef>
+            <a:effectRef idx="0">
+              <a:schemeClr val="accent1"/>
+            </a:effectRef>
+            <a:fontRef idx="minor">
+              <a:schemeClr val="lt1"/>
+            </a:fontRef>
+          </p:style>
+          <p:txBody>
+            <a:bodyPr rtlCol="0" anchor="ctr"/>
+            <a:lstStyle/>
+            <a:p>
+              <a:pPr algn="ctr"/>
+              <a:r>
+                <a:rPr lang="en-US" sz="1200" dirty="0">
+                  <a:solidFill>
+                    <a:schemeClr val="tx1"/>
+                  </a:solidFill>
+                </a:rPr>
+                <a:t>API method</a:t>
+              </a:r>
+            </a:p>
+          </p:txBody>
+        </p:sp>
+        <p:sp>
+          <p:nvSpPr>
+            <p:cNvPr id="6" name="Rectangle: Rounded Corners 5">
+              <a:extLst>
+                <a:ext uri="{FF2B5EF4-FFF2-40B4-BE49-F238E27FC236}">
+                  <a16:creationId xmlns:a16="http://schemas.microsoft.com/office/drawing/2014/main" id="{8E2DD96B-33A2-4814-862F-11134AF3DDDA}"/>
+                </a:ext>
+              </a:extLst>
+            </p:cNvPr>
+            <p:cNvSpPr/>
+            <p:nvPr/>
+          </p:nvSpPr>
+          <p:spPr>
+            <a:xfrm>
+              <a:off x="2895863" y="1276528"/>
+              <a:ext cx="796957" cy="360726"/>
+            </a:xfrm>
+            <a:prstGeom prst="roundRect">
+              <a:avLst/>
+            </a:prstGeom>
+            <a:solidFill>
+              <a:schemeClr val="accent2">
+                <a:lumMod val="20000"/>
+                <a:lumOff val="80000"/>
+              </a:schemeClr>
+            </a:solidFill>
+            <a:ln>
+              <a:noFill/>
+            </a:ln>
+          </p:spPr>
+          <p:style>
+            <a:lnRef idx="2">
+              <a:schemeClr val="accent1">
+                <a:shade val="50000"/>
+              </a:schemeClr>
+            </a:lnRef>
+            <a:fillRef idx="1">
+              <a:schemeClr val="accent1"/>
+            </a:fillRef>
+            <a:effectRef idx="0">
+              <a:schemeClr val="accent1"/>
+            </a:effectRef>
+            <a:fontRef idx="minor">
+              <a:schemeClr val="lt1"/>
+            </a:fontRef>
+          </p:style>
+          <p:txBody>
+            <a:bodyPr rtlCol="0" anchor="ctr"/>
+            <a:lstStyle/>
+            <a:p>
+              <a:pPr algn="ctr"/>
+              <a:r>
+                <a:rPr lang="en-US" sz="1200" dirty="0">
+                  <a:solidFill>
+                    <a:schemeClr val="tx1"/>
+                  </a:solidFill>
+                </a:rPr>
+                <a:t>Graph function</a:t>
+              </a:r>
+            </a:p>
+          </p:txBody>
+        </p:sp>
+        <p:grpSp>
+          <p:nvGrpSpPr>
+            <p:cNvPr id="7" name="Group 6">
+              <a:extLst>
+                <a:ext uri="{FF2B5EF4-FFF2-40B4-BE49-F238E27FC236}">
+                  <a16:creationId xmlns:a16="http://schemas.microsoft.com/office/drawing/2014/main" id="{5BD3BC34-8806-4AA7-8C50-7189B6DBD4A7}"/>
+                </a:ext>
+              </a:extLst>
+            </p:cNvPr>
+            <p:cNvGrpSpPr/>
+            <p:nvPr/>
+          </p:nvGrpSpPr>
+          <p:grpSpPr>
+            <a:xfrm>
+              <a:off x="1065402" y="1807746"/>
+              <a:ext cx="1125130" cy="276999"/>
+              <a:chOff x="1065402" y="1807746"/>
+              <a:chExt cx="1125130" cy="276999"/>
+            </a:xfrm>
+          </p:grpSpPr>
+          <p:cxnSp>
+            <p:nvCxnSpPr>
+              <p:cNvPr id="8" name="Straight Arrow Connector 7">
+                <a:extLst>
+                  <a:ext uri="{FF2B5EF4-FFF2-40B4-BE49-F238E27FC236}">
+                    <a16:creationId xmlns:a16="http://schemas.microsoft.com/office/drawing/2014/main" id="{9C04ACB8-C072-4069-ABBB-81DC331423BA}"/>
+                  </a:ext>
+                </a:extLst>
+              </p:cNvPr>
+              <p:cNvCxnSpPr/>
+              <p:nvPr/>
+            </p:nvCxnSpPr>
+            <p:spPr>
+              <a:xfrm>
+                <a:off x="1065402" y="1946246"/>
+                <a:ext cx="578840" cy="0"/>
+              </a:xfrm>
+              <a:prstGeom prst="straightConnector1">
+                <a:avLst/>
+              </a:prstGeom>
+              <a:ln w="38100">
+                <a:solidFill>
+                  <a:srgbClr val="00B050"/>
+                </a:solidFill>
+                <a:tailEnd type="triangle"/>
+              </a:ln>
+            </p:spPr>
+            <p:style>
+              <a:lnRef idx="1">
+                <a:schemeClr val="accent1"/>
+              </a:lnRef>
+              <a:fillRef idx="0">
+                <a:schemeClr val="accent1"/>
+              </a:fillRef>
+              <a:effectRef idx="0">
+                <a:schemeClr val="accent1"/>
+              </a:effectRef>
+              <a:fontRef idx="minor">
+                <a:schemeClr val="tx1"/>
+              </a:fontRef>
+            </p:style>
+          </p:cxnSp>
+          <p:sp>
+            <p:nvSpPr>
+              <p:cNvPr id="9" name="TextBox 8">
+                <a:extLst>
+                  <a:ext uri="{FF2B5EF4-FFF2-40B4-BE49-F238E27FC236}">
+                    <a16:creationId xmlns:a16="http://schemas.microsoft.com/office/drawing/2014/main" id="{B2B94383-5778-4EA1-B6EB-5CAACD034276}"/>
+                  </a:ext>
+                </a:extLst>
+              </p:cNvPr>
+              <p:cNvSpPr txBox="1"/>
+              <p:nvPr/>
+            </p:nvSpPr>
+            <p:spPr>
+              <a:xfrm>
+                <a:off x="1718736" y="1807746"/>
+                <a:ext cx="471796" cy="276999"/>
+              </a:xfrm>
+              <a:prstGeom prst="rect">
+                <a:avLst/>
+              </a:prstGeom>
+              <a:noFill/>
+            </p:spPr>
+            <p:txBody>
+              <a:bodyPr wrap="none" rtlCol="0">
+                <a:spAutoFit/>
+              </a:bodyPr>
+              <a:lstStyle/>
+              <a:p>
+                <a:r>
+                  <a:rPr lang="en-US" sz="1200" dirty="0"/>
+                  <a:t>float</a:t>
+                </a:r>
+              </a:p>
+            </p:txBody>
+          </p:sp>
+        </p:grpSp>
+        <p:grpSp>
+          <p:nvGrpSpPr>
+            <p:cNvPr id="10" name="Group 9">
+              <a:extLst>
+                <a:ext uri="{FF2B5EF4-FFF2-40B4-BE49-F238E27FC236}">
+                  <a16:creationId xmlns:a16="http://schemas.microsoft.com/office/drawing/2014/main" id="{48B22425-06D3-488E-A43C-E9F09231BA7D}"/>
+                </a:ext>
+              </a:extLst>
+            </p:cNvPr>
+            <p:cNvGrpSpPr/>
+            <p:nvPr/>
+          </p:nvGrpSpPr>
+          <p:grpSpPr>
+            <a:xfrm>
+              <a:off x="2303216" y="1792856"/>
+              <a:ext cx="1003302" cy="276999"/>
+              <a:chOff x="1065402" y="1807746"/>
+              <a:chExt cx="1003302" cy="276999"/>
+            </a:xfrm>
+          </p:grpSpPr>
+          <p:cxnSp>
+            <p:nvCxnSpPr>
+              <p:cNvPr id="11" name="Straight Arrow Connector 10">
+                <a:extLst>
+                  <a:ext uri="{FF2B5EF4-FFF2-40B4-BE49-F238E27FC236}">
+                    <a16:creationId xmlns:a16="http://schemas.microsoft.com/office/drawing/2014/main" id="{15179DE1-4F54-4194-AE94-94579FD1F59D}"/>
+                  </a:ext>
+                </a:extLst>
+              </p:cNvPr>
+              <p:cNvCxnSpPr/>
+              <p:nvPr/>
+            </p:nvCxnSpPr>
+            <p:spPr>
+              <a:xfrm>
+                <a:off x="1065402" y="1946246"/>
+                <a:ext cx="578840" cy="0"/>
+              </a:xfrm>
+              <a:prstGeom prst="straightConnector1">
+                <a:avLst/>
+              </a:prstGeom>
+              <a:ln w="38100">
+                <a:solidFill>
+                  <a:schemeClr val="accent4">
+                    <a:lumMod val="40000"/>
+                    <a:lumOff val="60000"/>
+                  </a:schemeClr>
+                </a:solidFill>
+                <a:tailEnd type="triangle"/>
+              </a:ln>
+            </p:spPr>
+            <p:style>
+              <a:lnRef idx="1">
+                <a:schemeClr val="accent1"/>
+              </a:lnRef>
+              <a:fillRef idx="0">
+                <a:schemeClr val="accent1"/>
+              </a:fillRef>
+              <a:effectRef idx="0">
+                <a:schemeClr val="accent1"/>
+              </a:effectRef>
+              <a:fontRef idx="minor">
+                <a:schemeClr val="tx1"/>
+              </a:fontRef>
+            </p:style>
+          </p:cxnSp>
+          <p:sp>
+            <p:nvSpPr>
+              <p:cNvPr id="12" name="TextBox 11">
+                <a:extLst>
+                  <a:ext uri="{FF2B5EF4-FFF2-40B4-BE49-F238E27FC236}">
+                    <a16:creationId xmlns:a16="http://schemas.microsoft.com/office/drawing/2014/main" id="{9E951216-D63A-44FC-A4A1-53C6B18D130F}"/>
+                  </a:ext>
+                </a:extLst>
+              </p:cNvPr>
+              <p:cNvSpPr txBox="1"/>
+              <p:nvPr/>
+            </p:nvSpPr>
+            <p:spPr>
+              <a:xfrm>
+                <a:off x="1718736" y="1807746"/>
+                <a:ext cx="349968" cy="276999"/>
+              </a:xfrm>
+              <a:prstGeom prst="rect">
+                <a:avLst/>
+              </a:prstGeom>
+              <a:noFill/>
+            </p:spPr>
+            <p:txBody>
+              <a:bodyPr wrap="none" rtlCol="0">
+                <a:spAutoFit/>
+              </a:bodyPr>
+              <a:lstStyle/>
+              <a:p>
+                <a:r>
+                  <a:rPr lang="en-US" sz="1200" dirty="0"/>
+                  <a:t>int</a:t>
+                </a:r>
+              </a:p>
+            </p:txBody>
+          </p:sp>
+        </p:grpSp>
+        <p:grpSp>
+          <p:nvGrpSpPr>
+            <p:cNvPr id="13" name="Group 12">
+              <a:extLst>
+                <a:ext uri="{FF2B5EF4-FFF2-40B4-BE49-F238E27FC236}">
+                  <a16:creationId xmlns:a16="http://schemas.microsoft.com/office/drawing/2014/main" id="{DC03542F-6E81-481A-837B-C2F96D35676F}"/>
+                </a:ext>
+              </a:extLst>
+            </p:cNvPr>
+            <p:cNvGrpSpPr/>
+            <p:nvPr/>
+          </p:nvGrpSpPr>
+          <p:grpSpPr>
+            <a:xfrm>
+              <a:off x="1065402" y="2023796"/>
+              <a:ext cx="1116922" cy="276999"/>
+              <a:chOff x="1065402" y="1807746"/>
+              <a:chExt cx="1116922" cy="276999"/>
+            </a:xfrm>
+          </p:grpSpPr>
+          <p:cxnSp>
+            <p:nvCxnSpPr>
+              <p:cNvPr id="14" name="Straight Arrow Connector 13">
+                <a:extLst>
+                  <a:ext uri="{FF2B5EF4-FFF2-40B4-BE49-F238E27FC236}">
+                    <a16:creationId xmlns:a16="http://schemas.microsoft.com/office/drawing/2014/main" id="{18FB9B0B-2DFE-4F4E-92E2-79A49A6A604C}"/>
+                  </a:ext>
+                </a:extLst>
+              </p:cNvPr>
+              <p:cNvCxnSpPr/>
+              <p:nvPr/>
+            </p:nvCxnSpPr>
+            <p:spPr>
+              <a:xfrm>
+                <a:off x="1065402" y="1946246"/>
+                <a:ext cx="578840" cy="0"/>
+              </a:xfrm>
+              <a:prstGeom prst="straightConnector1">
+                <a:avLst/>
+              </a:prstGeom>
+              <a:ln w="38100">
+                <a:solidFill>
+                  <a:srgbClr val="C00000"/>
+                </a:solidFill>
+                <a:tailEnd type="triangle"/>
+              </a:ln>
+            </p:spPr>
+            <p:style>
+              <a:lnRef idx="1">
+                <a:schemeClr val="accent1"/>
+              </a:lnRef>
+              <a:fillRef idx="0">
+                <a:schemeClr val="accent1"/>
+              </a:fillRef>
+              <a:effectRef idx="0">
+                <a:schemeClr val="accent1"/>
+              </a:effectRef>
+              <a:fontRef idx="minor">
+                <a:schemeClr val="tx1"/>
+              </a:fontRef>
+            </p:style>
+          </p:cxnSp>
+          <p:sp>
+            <p:nvSpPr>
+              <p:cNvPr id="15" name="TextBox 14">
+                <a:extLst>
+                  <a:ext uri="{FF2B5EF4-FFF2-40B4-BE49-F238E27FC236}">
+                    <a16:creationId xmlns:a16="http://schemas.microsoft.com/office/drawing/2014/main" id="{F8602AC7-67EC-4837-9285-21EC47E7EF53}"/>
+                  </a:ext>
+                </a:extLst>
+              </p:cNvPr>
+              <p:cNvSpPr txBox="1"/>
+              <p:nvPr/>
+            </p:nvSpPr>
+            <p:spPr>
+              <a:xfrm>
+                <a:off x="1718736" y="1807746"/>
+                <a:ext cx="463588" cy="276999"/>
+              </a:xfrm>
+              <a:prstGeom prst="rect">
+                <a:avLst/>
+              </a:prstGeom>
+              <a:noFill/>
+            </p:spPr>
+            <p:txBody>
+              <a:bodyPr wrap="none" rtlCol="0">
+                <a:spAutoFit/>
+              </a:bodyPr>
+              <a:lstStyle/>
+              <a:p>
+                <a:r>
+                  <a:rPr lang="en-US" sz="1200" dirty="0"/>
+                  <a:t>bool</a:t>
+                </a:r>
+              </a:p>
+            </p:txBody>
+          </p:sp>
+        </p:grpSp>
+        <p:sp>
+          <p:nvSpPr>
+            <p:cNvPr id="16" name="TextBox 15">
+              <a:extLst>
+                <a:ext uri="{FF2B5EF4-FFF2-40B4-BE49-F238E27FC236}">
+                  <a16:creationId xmlns:a16="http://schemas.microsoft.com/office/drawing/2014/main" id="{D549DE17-3BA4-4FEF-B3DA-B1F1D788836C}"/>
+                </a:ext>
+              </a:extLst>
+            </p:cNvPr>
+            <p:cNvSpPr txBox="1"/>
+            <p:nvPr/>
+          </p:nvSpPr>
+          <p:spPr>
+            <a:xfrm>
+              <a:off x="968852" y="2466283"/>
+              <a:ext cx="2853089" cy="1015663"/>
+            </a:xfrm>
+            <a:prstGeom prst="rect">
+              <a:avLst/>
+            </a:prstGeom>
+            <a:noFill/>
+          </p:spPr>
+          <p:txBody>
+            <a:bodyPr wrap="none" rtlCol="0">
+              <a:spAutoFit/>
+            </a:bodyPr>
+            <a:lstStyle/>
+            <a:p>
+              <a:r>
+                <a:rPr lang="en-US" sz="1200" dirty="0"/>
+                <a:t>+B (batch rank)         +T (time rank)</a:t>
+              </a:r>
+            </a:p>
+            <a:p>
+              <a:endParaRPr lang="en-US" sz="1200" dirty="0"/>
+            </a:p>
+            <a:p>
+              <a:r>
+                <a:rPr lang="en-US" sz="1200" dirty="0"/>
+                <a:t>in-0/1.. (input call into API/graph-</a:t>
+              </a:r>
+              <a:r>
+                <a:rPr lang="en-US" sz="1200" dirty="0" err="1"/>
+                <a:t>fn</a:t>
+              </a:r>
+              <a:r>
+                <a:rPr lang="en-US" sz="1200" dirty="0"/>
+                <a:t>)</a:t>
+              </a:r>
+            </a:p>
+            <a:p>
+              <a:r>
+                <a:rPr lang="en-US" sz="1200" dirty="0"/>
+                <a:t>out-0/1.. (return values from API/graph-</a:t>
+              </a:r>
+              <a:r>
+                <a:rPr lang="en-US" sz="1200" dirty="0" err="1"/>
+                <a:t>fn</a:t>
+              </a:r>
+              <a:r>
+                <a:rPr lang="en-US" sz="1200" dirty="0"/>
+                <a:t>)</a:t>
+              </a:r>
+            </a:p>
+            <a:p>
+              <a:endParaRPr lang="en-US" sz="1200" dirty="0"/>
+            </a:p>
+          </p:txBody>
+        </p:sp>
+        <p:grpSp>
+          <p:nvGrpSpPr>
+            <p:cNvPr id="17" name="Group 16">
+              <a:extLst>
+                <a:ext uri="{FF2B5EF4-FFF2-40B4-BE49-F238E27FC236}">
+                  <a16:creationId xmlns:a16="http://schemas.microsoft.com/office/drawing/2014/main" id="{3B23105E-8814-4745-A16E-344DEEA53D72}"/>
+                </a:ext>
+              </a:extLst>
+            </p:cNvPr>
+            <p:cNvGrpSpPr/>
+            <p:nvPr/>
+          </p:nvGrpSpPr>
+          <p:grpSpPr>
+            <a:xfrm>
+              <a:off x="2303216" y="2030445"/>
+              <a:ext cx="1181043" cy="276999"/>
+              <a:chOff x="1065402" y="1807746"/>
+              <a:chExt cx="1181043" cy="276999"/>
+            </a:xfrm>
+          </p:grpSpPr>
+          <p:cxnSp>
+            <p:nvCxnSpPr>
+              <p:cNvPr id="18" name="Straight Arrow Connector 17">
+                <a:extLst>
+                  <a:ext uri="{FF2B5EF4-FFF2-40B4-BE49-F238E27FC236}">
+                    <a16:creationId xmlns:a16="http://schemas.microsoft.com/office/drawing/2014/main" id="{317D6FD4-29D4-4908-8351-80020D5E8841}"/>
+                  </a:ext>
+                </a:extLst>
+              </p:cNvPr>
+              <p:cNvCxnSpPr/>
+              <p:nvPr/>
+            </p:nvCxnSpPr>
+            <p:spPr>
+              <a:xfrm>
+                <a:off x="1065402" y="1946246"/>
+                <a:ext cx="578840" cy="0"/>
+              </a:xfrm>
+              <a:prstGeom prst="straightConnector1">
+                <a:avLst/>
+              </a:prstGeom>
+              <a:ln w="38100">
+                <a:solidFill>
+                  <a:schemeClr val="tx1">
+                    <a:lumMod val="50000"/>
+                    <a:lumOff val="50000"/>
+                  </a:schemeClr>
+                </a:solidFill>
+                <a:tailEnd type="triangle"/>
+              </a:ln>
+            </p:spPr>
+            <p:style>
+              <a:lnRef idx="1">
+                <a:schemeClr val="accent1"/>
+              </a:lnRef>
+              <a:fillRef idx="0">
+                <a:schemeClr val="accent1"/>
+              </a:fillRef>
+              <a:effectRef idx="0">
+                <a:schemeClr val="accent1"/>
+              </a:effectRef>
+              <a:fontRef idx="minor">
+                <a:schemeClr val="tx1"/>
+              </a:fontRef>
+            </p:style>
+          </p:cxnSp>
+          <p:sp>
+            <p:nvSpPr>
+              <p:cNvPr id="19" name="TextBox 18">
+                <a:extLst>
+                  <a:ext uri="{FF2B5EF4-FFF2-40B4-BE49-F238E27FC236}">
+                    <a16:creationId xmlns:a16="http://schemas.microsoft.com/office/drawing/2014/main" id="{F4F117A9-2887-4294-8B01-B2112236C61E}"/>
+                  </a:ext>
+                </a:extLst>
+              </p:cNvPr>
+              <p:cNvSpPr txBox="1"/>
+              <p:nvPr/>
+            </p:nvSpPr>
+            <p:spPr>
+              <a:xfrm>
+                <a:off x="1718736" y="1807746"/>
+                <a:ext cx="527709" cy="276999"/>
+              </a:xfrm>
+              <a:prstGeom prst="rect">
+                <a:avLst/>
+              </a:prstGeom>
+              <a:noFill/>
+            </p:spPr>
+            <p:txBody>
+              <a:bodyPr wrap="none" rtlCol="0">
+                <a:spAutoFit/>
+              </a:bodyPr>
+              <a:lstStyle/>
+              <a:p>
+                <a:r>
+                  <a:rPr lang="en-US" sz="1200" dirty="0"/>
+                  <a:t>other</a:t>
+                </a:r>
+              </a:p>
+            </p:txBody>
+          </p:sp>
+        </p:grpSp>
+        <p:sp>
+          <p:nvSpPr>
+            <p:cNvPr id="20" name="Rectangle: Rounded Corners 19">
+              <a:extLst>
+                <a:ext uri="{FF2B5EF4-FFF2-40B4-BE49-F238E27FC236}">
+                  <a16:creationId xmlns:a16="http://schemas.microsoft.com/office/drawing/2014/main" id="{8A7BDD5D-501A-4D85-9922-677491BD537F}"/>
+                </a:ext>
+              </a:extLst>
+            </p:cNvPr>
+            <p:cNvSpPr/>
+            <p:nvPr/>
+          </p:nvSpPr>
+          <p:spPr>
+            <a:xfrm>
+              <a:off x="968852" y="1282724"/>
+              <a:ext cx="964735" cy="360726"/>
+            </a:xfrm>
+            <a:prstGeom prst="roundRect">
+              <a:avLst/>
+            </a:prstGeom>
+            <a:noFill/>
+            <a:ln w="28575">
+              <a:solidFill>
+                <a:schemeClr val="accent1"/>
+              </a:solidFill>
+            </a:ln>
+          </p:spPr>
+          <p:style>
+            <a:lnRef idx="2">
+              <a:schemeClr val="accent1">
+                <a:shade val="50000"/>
+              </a:schemeClr>
+            </a:lnRef>
+            <a:fillRef idx="1">
+              <a:schemeClr val="accent1"/>
+            </a:fillRef>
+            <a:effectRef idx="0">
+              <a:schemeClr val="accent1"/>
+            </a:effectRef>
+            <a:fontRef idx="minor">
+              <a:schemeClr val="lt1"/>
+            </a:fontRef>
+          </p:style>
+          <p:txBody>
+            <a:bodyPr rtlCol="0" anchor="ctr"/>
+            <a:lstStyle/>
+            <a:p>
+              <a:pPr algn="ctr"/>
+              <a:r>
+                <a:rPr lang="en-US" sz="1200" dirty="0">
+                  <a:solidFill>
+                    <a:schemeClr val="tx1"/>
+                  </a:solidFill>
+                </a:rPr>
+                <a:t>Component</a:t>
+              </a:r>
+            </a:p>
+          </p:txBody>
+        </p:sp>
+      </p:grpSp>
+    </p:spTree>
+    <p:extLst>
+      <p:ext uri="{BB962C8B-B14F-4D97-AF65-F5344CB8AC3E}">
+        <p14:creationId xmlns:p14="http://schemas.microsoft.com/office/powerpoint/2010/main" val="2416029821"/>
+      </p:ext>
+    </p:extLst>
+  </p:cSld>
+  <p:clrMapOvr>
+    <a:masterClrMapping/>
+  </p:clrMapOvr>
+</p:sld>
+</file>
+
 <file path=ppt/theme/theme1.xml><?xml version="1.0" encoding="utf-8"?>
 <a:theme xmlns:a="http://schemas.openxmlformats.org/drawingml/2006/main" name="Office Theme">
   <a:themeElements>

</xml_diff>